<commit_message>
Added brief outline to Session 4 plotting section
</commit_message>
<xml_diff>
--- a/Session 4 - Figures and plotting/MATLAB Session 4.pptx
+++ b/Session 4 - Figures and plotting/MATLAB Session 4.pptx
@@ -5,7 +5,7 @@
     <p:sldMasterId id="2147483678" r:id="rId1"/>
   </p:sldMasterIdLst>
   <p:notesMasterIdLst>
-    <p:notesMasterId r:id="rId13"/>
+    <p:notesMasterId r:id="rId14"/>
   </p:notesMasterIdLst>
   <p:sldIdLst>
     <p:sldId id="316" r:id="rId2"/>
@@ -17,8 +17,9 @@
     <p:sldId id="450" r:id="rId8"/>
     <p:sldId id="449" r:id="rId9"/>
     <p:sldId id="451" r:id="rId10"/>
-    <p:sldId id="444" r:id="rId11"/>
-    <p:sldId id="443" r:id="rId12"/>
+    <p:sldId id="452" r:id="rId11"/>
+    <p:sldId id="444" r:id="rId12"/>
+    <p:sldId id="443" r:id="rId13"/>
   </p:sldIdLst>
   <p:sldSz cx="12192000" cy="6858000"/>
   <p:notesSz cx="6669088" cy="9926638"/>
@@ -2277,6 +2278,162 @@
           <p:cNvPr id="2" name="Title 1">
             <a:extLst>
               <a:ext uri="{FF2B5EF4-FFF2-40B4-BE49-F238E27FC236}">
+                <a16:creationId xmlns:a16="http://schemas.microsoft.com/office/drawing/2014/main" id="{FA63CE58-31D3-4CE4-B980-300475A8D6AB}"/>
+              </a:ext>
+            </a:extLst>
+          </p:cNvPr>
+          <p:cNvSpPr>
+            <a:spLocks noGrp="1"/>
+          </p:cNvSpPr>
+          <p:nvPr>
+            <p:ph type="title"/>
+          </p:nvPr>
+        </p:nvSpPr>
+        <p:spPr/>
+        <p:txBody>
+          <a:bodyPr/>
+          <a:lstStyle/>
+          <a:p>
+            <a:endParaRPr lang="en-GB"/>
+          </a:p>
+        </p:txBody>
+      </p:sp>
+      <p:sp>
+        <p:nvSpPr>
+          <p:cNvPr id="3" name="Content Placeholder 2">
+            <a:extLst>
+              <a:ext uri="{FF2B5EF4-FFF2-40B4-BE49-F238E27FC236}">
+                <a16:creationId xmlns:a16="http://schemas.microsoft.com/office/drawing/2014/main" id="{D547804F-4C36-4E05-A85C-C0624CAF1BA9}"/>
+              </a:ext>
+            </a:extLst>
+          </p:cNvPr>
+          <p:cNvSpPr>
+            <a:spLocks noGrp="1"/>
+          </p:cNvSpPr>
+          <p:nvPr>
+            <p:ph idx="1"/>
+          </p:nvPr>
+        </p:nvSpPr>
+        <p:spPr/>
+        <p:txBody>
+          <a:bodyPr/>
+          <a:lstStyle/>
+          <a:p>
+            <a:r>
+              <a:rPr lang="en-GB" sz="2000" dirty="0"/>
+              <a:t>Introduction GUIs</a:t>
+            </a:r>
+          </a:p>
+          <a:p>
+            <a:pPr lvl="1"/>
+            <a:r>
+              <a:rPr lang="en-GB" sz="1200" dirty="0"/>
+              <a:t>Why would we want them</a:t>
+            </a:r>
+          </a:p>
+          <a:p>
+            <a:pPr lvl="1"/>
+            <a:r>
+              <a:rPr lang="en-GB" sz="1200" dirty="0"/>
+              <a:t>What sort of thing could they include</a:t>
+            </a:r>
+          </a:p>
+          <a:p>
+            <a:pPr lvl="1"/>
+            <a:endParaRPr lang="en-GB" sz="1200" dirty="0"/>
+          </a:p>
+          <a:p>
+            <a:r>
+              <a:rPr lang="en-GB" sz="2000" dirty="0"/>
+              <a:t>Talk about adding control elements to GUIs in the context of a simple push button</a:t>
+            </a:r>
+          </a:p>
+          <a:p>
+            <a:pPr lvl="1"/>
+            <a:r>
+              <a:rPr lang="en-GB" sz="1100" dirty="0" err="1"/>
+              <a:t>Callback</a:t>
+            </a:r>
+            <a:r>
+              <a:rPr lang="en-GB" sz="1100" dirty="0"/>
+              <a:t> functions</a:t>
+            </a:r>
+          </a:p>
+          <a:p>
+            <a:pPr lvl="1"/>
+            <a:r>
+              <a:rPr lang="en-GB" sz="1100" dirty="0"/>
+              <a:t>Enable/disable</a:t>
+            </a:r>
+          </a:p>
+          <a:p>
+            <a:pPr lvl="1"/>
+            <a:r>
+              <a:rPr lang="en-GB" sz="1100" dirty="0"/>
+              <a:t>Visible/not visible</a:t>
+            </a:r>
+          </a:p>
+          <a:p>
+            <a:pPr lvl="2"/>
+            <a:endParaRPr lang="en-GB" sz="900" dirty="0"/>
+          </a:p>
+          <a:p>
+            <a:pPr lvl="2"/>
+            <a:endParaRPr lang="en-GB" sz="1100" dirty="0"/>
+          </a:p>
+          <a:p>
+            <a:pPr lvl="2"/>
+            <a:endParaRPr lang="en-GB" sz="600" dirty="0"/>
+          </a:p>
+        </p:txBody>
+      </p:sp>
+    </p:spTree>
+    <p:extLst>
+      <p:ext uri="{BB962C8B-B14F-4D97-AF65-F5344CB8AC3E}">
+        <p14:creationId xmlns:p14="http://schemas.microsoft.com/office/powerpoint/2010/main" val="2789544707"/>
+      </p:ext>
+    </p:extLst>
+  </p:cSld>
+  <p:clrMapOvr>
+    <a:masterClrMapping/>
+  </p:clrMapOvr>
+  <mc:AlternateContent xmlns:mc="http://schemas.openxmlformats.org/markup-compatibility/2006" xmlns:p14="http://schemas.microsoft.com/office/powerpoint/2010/main">
+    <mc:Choice Requires="p14">
+      <p:transition p14:dur="300">
+        <p:fade/>
+      </p:transition>
+    </mc:Choice>
+    <mc:Fallback xmlns="">
+      <p:transition>
+        <p:fade/>
+      </p:transition>
+    </mc:Fallback>
+  </mc:AlternateContent>
+</p:sld>
+</file>
+
+<file path=ppt/slides/slide11.xml><?xml version="1.0" encoding="utf-8"?>
+<p:sld xmlns:a="http://schemas.openxmlformats.org/drawingml/2006/main" xmlns:r="http://schemas.openxmlformats.org/officeDocument/2006/relationships" xmlns:p="http://schemas.openxmlformats.org/presentationml/2006/main">
+  <p:cSld>
+    <p:spTree>
+      <p:nvGrpSpPr>
+        <p:cNvPr id="1" name=""/>
+        <p:cNvGrpSpPr/>
+        <p:nvPr/>
+      </p:nvGrpSpPr>
+      <p:grpSpPr>
+        <a:xfrm>
+          <a:off x="0" y="0"/>
+          <a:ext cx="0" cy="0"/>
+          <a:chOff x="0" y="0"/>
+          <a:chExt cx="0" cy="0"/>
+        </a:xfrm>
+      </p:grpSpPr>
+      <p:sp>
+        <p:nvSpPr>
+          <p:cNvPr id="2" name="Title 1">
+            <a:extLst>
+              <a:ext uri="{FF2B5EF4-FFF2-40B4-BE49-F238E27FC236}">
                 <a16:creationId xmlns:a16="http://schemas.microsoft.com/office/drawing/2014/main" id="{8EEF9218-B50A-424A-A99D-57BA08F4A8E3}"/>
               </a:ext>
             </a:extLst>
@@ -2363,7 +2520,7 @@
 </p:sld>
 </file>
 
-<file path=ppt/slides/slide11.xml><?xml version="1.0" encoding="utf-8"?>
+<file path=ppt/slides/slide12.xml><?xml version="1.0" encoding="utf-8"?>
 <p:sld xmlns:a="http://schemas.openxmlformats.org/drawingml/2006/main" xmlns:r="http://schemas.openxmlformats.org/officeDocument/2006/relationships" xmlns:p="http://schemas.openxmlformats.org/presentationml/2006/main">
   <p:cSld>
     <p:spTree>

</xml_diff>

<commit_message>
More bits for Session 4
</commit_message>
<xml_diff>
--- a/Session 4 - Figures and plotting/MATLAB Session 4.pptx
+++ b/Session 4 - Figures and plotting/MATLAB Session 4.pptx
@@ -5,7 +5,7 @@
     <p:sldMasterId id="2147483678" r:id="rId1"/>
   </p:sldMasterIdLst>
   <p:notesMasterIdLst>
-    <p:notesMasterId r:id="rId14"/>
+    <p:notesMasterId r:id="rId17"/>
   </p:notesMasterIdLst>
   <p:sldIdLst>
     <p:sldId id="316" r:id="rId2"/>
@@ -13,13 +13,16 @@
     <p:sldId id="407" r:id="rId4"/>
     <p:sldId id="445" r:id="rId5"/>
     <p:sldId id="447" r:id="rId6"/>
-    <p:sldId id="448" r:id="rId7"/>
-    <p:sldId id="450" r:id="rId8"/>
-    <p:sldId id="449" r:id="rId9"/>
-    <p:sldId id="451" r:id="rId10"/>
-    <p:sldId id="452" r:id="rId11"/>
-    <p:sldId id="444" r:id="rId12"/>
-    <p:sldId id="443" r:id="rId13"/>
+    <p:sldId id="453" r:id="rId7"/>
+    <p:sldId id="456" r:id="rId8"/>
+    <p:sldId id="457" r:id="rId9"/>
+    <p:sldId id="450" r:id="rId10"/>
+    <p:sldId id="454" r:id="rId11"/>
+    <p:sldId id="449" r:id="rId12"/>
+    <p:sldId id="451" r:id="rId13"/>
+    <p:sldId id="452" r:id="rId14"/>
+    <p:sldId id="444" r:id="rId15"/>
+    <p:sldId id="443" r:id="rId16"/>
   </p:sldIdLst>
   <p:sldSz cx="12192000" cy="6858000"/>
   <p:notesSz cx="6669088" cy="9926638"/>
@@ -417,7 +420,7 @@
           <a:p>
             <a:r>
               <a:rPr lang="en-GB" dirty="0"/>
-              <a:t>Convert this into 2 spider diagrams if there’s time</a:t>
+              <a:t>Figure size = [758   558   482   365]</a:t>
             </a:r>
           </a:p>
         </p:txBody>
@@ -425,7 +428,7 @@
     </p:spTree>
     <p:extLst>
       <p:ext uri="{BB962C8B-B14F-4D97-AF65-F5344CB8AC3E}">
-        <p14:creationId xmlns:p14="http://schemas.microsoft.com/office/powerpoint/2010/main" val="3197778528"/>
+        <p14:creationId xmlns:p14="http://schemas.microsoft.com/office/powerpoint/2010/main" val="1783469456"/>
       </p:ext>
     </p:extLst>
   </p:cSld>
@@ -489,6 +492,70 @@
     </p:spTree>
     <p:extLst>
       <p:ext uri="{BB962C8B-B14F-4D97-AF65-F5344CB8AC3E}">
+        <p14:creationId xmlns:p14="http://schemas.microsoft.com/office/powerpoint/2010/main" val="3197778528"/>
+      </p:ext>
+    </p:extLst>
+  </p:cSld>
+  <p:clrMapOvr>
+    <a:masterClrMapping/>
+  </p:clrMapOvr>
+</p:notes>
+</file>
+
+<file path=ppt/notesSlides/notesSlide4.xml><?xml version="1.0" encoding="utf-8"?>
+<p:notes xmlns:a="http://schemas.openxmlformats.org/drawingml/2006/main" xmlns:r="http://schemas.openxmlformats.org/officeDocument/2006/relationships" xmlns:p="http://schemas.openxmlformats.org/presentationml/2006/main">
+  <p:cSld>
+    <p:spTree>
+      <p:nvGrpSpPr>
+        <p:cNvPr id="1" name=""/>
+        <p:cNvGrpSpPr/>
+        <p:nvPr/>
+      </p:nvGrpSpPr>
+      <p:grpSpPr>
+        <a:xfrm>
+          <a:off x="0" y="0"/>
+          <a:ext cx="0" cy="0"/>
+          <a:chOff x="0" y="0"/>
+          <a:chExt cx="0" cy="0"/>
+        </a:xfrm>
+      </p:grpSpPr>
+      <p:sp>
+        <p:nvSpPr>
+          <p:cNvPr id="2" name="Slide Image Placeholder 1"/>
+          <p:cNvSpPr>
+            <a:spLocks noGrp="1" noRot="1" noChangeAspect="1"/>
+          </p:cNvSpPr>
+          <p:nvPr>
+            <p:ph type="sldImg"/>
+          </p:nvPr>
+        </p:nvSpPr>
+        <p:spPr/>
+      </p:sp>
+      <p:sp>
+        <p:nvSpPr>
+          <p:cNvPr id="3" name="Notes Placeholder 2"/>
+          <p:cNvSpPr>
+            <a:spLocks noGrp="1"/>
+          </p:cNvSpPr>
+          <p:nvPr>
+            <p:ph type="body" idx="1"/>
+          </p:nvPr>
+        </p:nvSpPr>
+        <p:spPr/>
+        <p:txBody>
+          <a:bodyPr/>
+          <a:lstStyle/>
+          <a:p>
+            <a:r>
+              <a:rPr lang="en-GB" dirty="0"/>
+              <a:t>Convert this into 2 spider diagrams if there’s time</a:t>
+            </a:r>
+          </a:p>
+        </p:txBody>
+      </p:sp>
+    </p:spTree>
+    <p:extLst>
+      <p:ext uri="{BB962C8B-B14F-4D97-AF65-F5344CB8AC3E}">
         <p14:creationId xmlns:p14="http://schemas.microsoft.com/office/powerpoint/2010/main" val="1956388116"/>
       </p:ext>
     </p:extLst>
@@ -499,7 +566,7 @@
 </p:notes>
 </file>
 
-<file path=ppt/notesSlides/notesSlide4.xml><?xml version="1.0" encoding="utf-8"?>
+<file path=ppt/notesSlides/notesSlide5.xml><?xml version="1.0" encoding="utf-8"?>
 <p:notes xmlns:a="http://schemas.openxmlformats.org/drawingml/2006/main" xmlns:r="http://schemas.openxmlformats.org/officeDocument/2006/relationships" xmlns:p="http://schemas.openxmlformats.org/presentationml/2006/main">
   <p:cSld>
     <p:spTree>
@@ -2278,6 +2345,518 @@
           <p:cNvPr id="2" name="Title 1">
             <a:extLst>
               <a:ext uri="{FF2B5EF4-FFF2-40B4-BE49-F238E27FC236}">
+                <a16:creationId xmlns:a16="http://schemas.microsoft.com/office/drawing/2014/main" id="{75D50EB5-46DE-4076-9A04-453EF016722F}"/>
+              </a:ext>
+            </a:extLst>
+          </p:cNvPr>
+          <p:cNvSpPr>
+            <a:spLocks noGrp="1"/>
+          </p:cNvSpPr>
+          <p:nvPr>
+            <p:ph type="title"/>
+          </p:nvPr>
+        </p:nvSpPr>
+        <p:spPr/>
+        <p:txBody>
+          <a:bodyPr/>
+          <a:lstStyle/>
+          <a:p>
+            <a:r>
+              <a:rPr lang="en-GB" dirty="0"/>
+              <a:t>Plotting data</a:t>
+            </a:r>
+          </a:p>
+        </p:txBody>
+      </p:sp>
+      <p:sp>
+        <p:nvSpPr>
+          <p:cNvPr id="3" name="Content Placeholder 2">
+            <a:extLst>
+              <a:ext uri="{FF2B5EF4-FFF2-40B4-BE49-F238E27FC236}">
+                <a16:creationId xmlns:a16="http://schemas.microsoft.com/office/drawing/2014/main" id="{4863AB74-B352-493F-BE21-42319B6CF008}"/>
+              </a:ext>
+            </a:extLst>
+          </p:cNvPr>
+          <p:cNvSpPr>
+            <a:spLocks noGrp="1"/>
+          </p:cNvSpPr>
+          <p:nvPr>
+            <p:ph idx="1"/>
+          </p:nvPr>
+        </p:nvSpPr>
+        <p:spPr/>
+        <p:txBody>
+          <a:bodyPr/>
+          <a:lstStyle/>
+          <a:p>
+            <a:r>
+              <a:rPr lang="en-GB" dirty="0"/>
+              <a:t>All graphical components live within a figure</a:t>
+            </a:r>
+          </a:p>
+          <a:p>
+            <a:pPr lvl="1"/>
+            <a:r>
+              <a:rPr lang="en-GB" dirty="0"/>
+              <a:t>The </a:t>
+            </a:r>
+            <a:r>
+              <a:rPr lang="en-GB" i="1" dirty="0">
+                <a:solidFill>
+                  <a:schemeClr val="accent1"/>
+                </a:solidFill>
+              </a:rPr>
+              <a:t>figure</a:t>
+            </a:r>
+            <a:r>
+              <a:rPr lang="en-GB" dirty="0"/>
+              <a:t> object is simply a container window</a:t>
+            </a:r>
+          </a:p>
+          <a:p>
+            <a:pPr lvl="1"/>
+            <a:endParaRPr lang="en-GB" sz="1200" dirty="0"/>
+          </a:p>
+          <a:p>
+            <a:r>
+              <a:rPr lang="en-GB" dirty="0"/>
+              <a:t>A figure is an object (Session 3)</a:t>
+            </a:r>
+          </a:p>
+          <a:p>
+            <a:pPr lvl="1"/>
+            <a:r>
+              <a:rPr lang="en-GB" dirty="0"/>
+              <a:t>Properties include</a:t>
+            </a:r>
+          </a:p>
+          <a:p>
+            <a:pPr lvl="2"/>
+            <a:r>
+              <a:rPr lang="en-GB" dirty="0"/>
+              <a:t>Name (title)</a:t>
+            </a:r>
+          </a:p>
+          <a:p>
+            <a:pPr lvl="2"/>
+            <a:r>
+              <a:rPr lang="en-GB" dirty="0"/>
+              <a:t>Position</a:t>
+            </a:r>
+          </a:p>
+          <a:p>
+            <a:pPr lvl="1"/>
+            <a:r>
+              <a:rPr lang="en-GB" dirty="0"/>
+              <a:t>Methods include</a:t>
+            </a:r>
+          </a:p>
+          <a:p>
+            <a:pPr lvl="2"/>
+            <a:r>
+              <a:rPr lang="en-GB" dirty="0"/>
+              <a:t>delete (close window)</a:t>
+            </a:r>
+          </a:p>
+          <a:p>
+            <a:pPr lvl="2"/>
+            <a:endParaRPr lang="en-GB" sz="1200" dirty="0"/>
+          </a:p>
+          <a:p>
+            <a:r>
+              <a:rPr lang="en-GB" dirty="0"/>
+              <a:t>We’ve used figures when viewing images</a:t>
+            </a:r>
+          </a:p>
+          <a:p>
+            <a:pPr lvl="1"/>
+            <a:endParaRPr lang="en-GB" dirty="0"/>
+          </a:p>
+          <a:p>
+            <a:pPr lvl="1"/>
+            <a:endParaRPr lang="en-GB" dirty="0"/>
+          </a:p>
+        </p:txBody>
+      </p:sp>
+      <p:grpSp>
+        <p:nvGrpSpPr>
+          <p:cNvPr id="11" name="Group 10">
+            <a:extLst>
+              <a:ext uri="{FF2B5EF4-FFF2-40B4-BE49-F238E27FC236}">
+                <a16:creationId xmlns:a16="http://schemas.microsoft.com/office/drawing/2014/main" id="{B5B14166-21E1-405F-8DE1-33B9B26EAEDB}"/>
+              </a:ext>
+            </a:extLst>
+          </p:cNvPr>
+          <p:cNvGrpSpPr/>
+          <p:nvPr/>
+        </p:nvGrpSpPr>
+        <p:grpSpPr>
+          <a:xfrm>
+            <a:off x="7627904" y="1502891"/>
+            <a:ext cx="4293659" cy="4198718"/>
+            <a:chOff x="7627904" y="1329641"/>
+            <a:chExt cx="4293659" cy="4198718"/>
+          </a:xfrm>
+        </p:grpSpPr>
+        <p:pic>
+          <p:nvPicPr>
+            <p:cNvPr id="6" name="Picture 5">
+              <a:extLst>
+                <a:ext uri="{FF2B5EF4-FFF2-40B4-BE49-F238E27FC236}">
+                  <a16:creationId xmlns:a16="http://schemas.microsoft.com/office/drawing/2014/main" id="{D6404EE0-28F7-41D7-8C3D-AFA856BA805B}"/>
+                </a:ext>
+              </a:extLst>
+            </p:cNvPr>
+            <p:cNvPicPr>
+              <a:picLocks noChangeAspect="1"/>
+            </p:cNvPicPr>
+            <p:nvPr/>
+          </p:nvPicPr>
+          <p:blipFill>
+            <a:blip r:embed="rId2"/>
+            <a:stretch>
+              <a:fillRect/>
+            </a:stretch>
+          </p:blipFill>
+          <p:spPr>
+            <a:xfrm>
+              <a:off x="7793534" y="1794559"/>
+              <a:ext cx="3962400" cy="3733800"/>
+            </a:xfrm>
+            <a:prstGeom prst="rect">
+              <a:avLst/>
+            </a:prstGeom>
+          </p:spPr>
+        </p:pic>
+        <p:sp>
+          <p:nvSpPr>
+            <p:cNvPr id="7" name="TextBox 6">
+              <a:extLst>
+                <a:ext uri="{FF2B5EF4-FFF2-40B4-BE49-F238E27FC236}">
+                  <a16:creationId xmlns:a16="http://schemas.microsoft.com/office/drawing/2014/main" id="{ADA550D8-92F7-4DFB-94B4-961CBEDD9540}"/>
+                </a:ext>
+              </a:extLst>
+            </p:cNvPr>
+            <p:cNvSpPr txBox="1"/>
+            <p:nvPr/>
+          </p:nvSpPr>
+          <p:spPr>
+            <a:xfrm>
+              <a:off x="7627904" y="1329641"/>
+              <a:ext cx="4293659" cy="461665"/>
+            </a:xfrm>
+            <a:prstGeom prst="rect">
+              <a:avLst/>
+            </a:prstGeom>
+            <a:noFill/>
+          </p:spPr>
+          <p:txBody>
+            <a:bodyPr wrap="square" rtlCol="0">
+              <a:spAutoFit/>
+            </a:bodyPr>
+            <a:lstStyle/>
+            <a:p>
+              <a:pPr algn="ctr"/>
+              <a:r>
+                <a:rPr lang="en-GB" sz="2400" i="1" dirty="0" err="1">
+                  <a:solidFill>
+                    <a:schemeClr val="accent1"/>
+                  </a:solidFill>
+                </a:rPr>
+                <a:t>my_fig</a:t>
+              </a:r>
+              <a:r>
+                <a:rPr lang="en-GB" sz="2400" i="1" dirty="0">
+                  <a:solidFill>
+                    <a:schemeClr val="accent1"/>
+                  </a:solidFill>
+                </a:rPr>
+                <a:t> = figure()</a:t>
+              </a:r>
+            </a:p>
+          </p:txBody>
+        </p:sp>
+      </p:grpSp>
+      <p:grpSp>
+        <p:nvGrpSpPr>
+          <p:cNvPr id="8" name="Group 7">
+            <a:extLst>
+              <a:ext uri="{FF2B5EF4-FFF2-40B4-BE49-F238E27FC236}">
+                <a16:creationId xmlns:a16="http://schemas.microsoft.com/office/drawing/2014/main" id="{AC97AE24-DA52-4AFC-AD93-39609E8F1285}"/>
+              </a:ext>
+            </a:extLst>
+          </p:cNvPr>
+          <p:cNvGrpSpPr/>
+          <p:nvPr/>
+        </p:nvGrpSpPr>
+        <p:grpSpPr>
+          <a:xfrm>
+            <a:off x="7627904" y="1502891"/>
+            <a:ext cx="4293659" cy="4198718"/>
+            <a:chOff x="7627904" y="1329641"/>
+            <a:chExt cx="4293659" cy="4198718"/>
+          </a:xfrm>
+        </p:grpSpPr>
+        <p:pic>
+          <p:nvPicPr>
+            <p:cNvPr id="9" name="Picture 8">
+              <a:extLst>
+                <a:ext uri="{FF2B5EF4-FFF2-40B4-BE49-F238E27FC236}">
+                  <a16:creationId xmlns:a16="http://schemas.microsoft.com/office/drawing/2014/main" id="{A36E4B39-FE4F-4F6B-84EA-CE5063ABE2B9}"/>
+                </a:ext>
+              </a:extLst>
+            </p:cNvPr>
+            <p:cNvPicPr>
+              <a:picLocks noChangeAspect="1"/>
+            </p:cNvPicPr>
+            <p:nvPr/>
+          </p:nvPicPr>
+          <p:blipFill>
+            <a:blip r:embed="rId3"/>
+            <a:stretch>
+              <a:fillRect/>
+            </a:stretch>
+          </p:blipFill>
+          <p:spPr>
+            <a:xfrm>
+              <a:off x="7793534" y="1794559"/>
+              <a:ext cx="3962400" cy="3733800"/>
+            </a:xfrm>
+            <a:prstGeom prst="rect">
+              <a:avLst/>
+            </a:prstGeom>
+          </p:spPr>
+        </p:pic>
+        <p:sp>
+          <p:nvSpPr>
+            <p:cNvPr id="10" name="TextBox 9">
+              <a:extLst>
+                <a:ext uri="{FF2B5EF4-FFF2-40B4-BE49-F238E27FC236}">
+                  <a16:creationId xmlns:a16="http://schemas.microsoft.com/office/drawing/2014/main" id="{55BF7ECA-2638-4787-9329-BE5C2980F730}"/>
+                </a:ext>
+              </a:extLst>
+            </p:cNvPr>
+            <p:cNvSpPr txBox="1"/>
+            <p:nvPr/>
+          </p:nvSpPr>
+          <p:spPr>
+            <a:xfrm>
+              <a:off x="7627904" y="1329641"/>
+              <a:ext cx="4293659" cy="461665"/>
+            </a:xfrm>
+            <a:prstGeom prst="rect">
+              <a:avLst/>
+            </a:prstGeom>
+            <a:noFill/>
+          </p:spPr>
+          <p:txBody>
+            <a:bodyPr wrap="square" rtlCol="0">
+              <a:spAutoFit/>
+            </a:bodyPr>
+            <a:lstStyle/>
+            <a:p>
+              <a:pPr algn="ctr"/>
+              <a:r>
+                <a:rPr lang="en-GB" sz="2400" i="1" dirty="0" err="1">
+                  <a:solidFill>
+                    <a:schemeClr val="accent1"/>
+                  </a:solidFill>
+                </a:rPr>
+                <a:t>imshow</a:t>
+              </a:r>
+              <a:r>
+                <a:rPr lang="en-GB" sz="2400" i="1" dirty="0">
+                  <a:solidFill>
+                    <a:schemeClr val="accent1"/>
+                  </a:solidFill>
+                </a:rPr>
+                <a:t>(</a:t>
+              </a:r>
+              <a:r>
+                <a:rPr lang="en-GB" sz="2400" i="1" dirty="0" err="1">
+                  <a:solidFill>
+                    <a:schemeClr val="accent1"/>
+                  </a:solidFill>
+                </a:rPr>
+                <a:t>some_image</a:t>
+              </a:r>
+              <a:r>
+                <a:rPr lang="en-GB" sz="2400" i="1" dirty="0">
+                  <a:solidFill>
+                    <a:schemeClr val="accent1"/>
+                  </a:solidFill>
+                </a:rPr>
+                <a:t>, [])</a:t>
+              </a:r>
+            </a:p>
+          </p:txBody>
+        </p:sp>
+      </p:grpSp>
+    </p:spTree>
+    <p:extLst>
+      <p:ext uri="{BB962C8B-B14F-4D97-AF65-F5344CB8AC3E}">
+        <p14:creationId xmlns:p14="http://schemas.microsoft.com/office/powerpoint/2010/main" val="3398333505"/>
+      </p:ext>
+    </p:extLst>
+  </p:cSld>
+  <p:clrMapOvr>
+    <a:masterClrMapping/>
+  </p:clrMapOvr>
+  <mc:AlternateContent xmlns:mc="http://schemas.openxmlformats.org/markup-compatibility/2006" xmlns:p14="http://schemas.microsoft.com/office/powerpoint/2010/main">
+    <mc:Choice Requires="p14">
+      <p:transition p14:dur="300">
+        <p:fade/>
+      </p:transition>
+    </mc:Choice>
+    <mc:Fallback xmlns="">
+      <p:transition>
+        <p:fade/>
+      </p:transition>
+    </mc:Fallback>
+  </mc:AlternateContent>
+  <p:timing>
+    <p:tnLst>
+      <p:par>
+        <p:cTn id="1" dur="indefinite" restart="never" nodeType="tmRoot">
+          <p:childTnLst>
+            <p:seq concurrent="1" nextAc="seek">
+              <p:cTn id="2" dur="indefinite" nodeType="mainSeq">
+                <p:childTnLst>
+                  <p:par>
+                    <p:cTn id="3" fill="hold">
+                      <p:stCondLst>
+                        <p:cond delay="indefinite"/>
+                      </p:stCondLst>
+                      <p:childTnLst>
+                        <p:par>
+                          <p:cTn id="4" fill="hold">
+                            <p:stCondLst>
+                              <p:cond delay="0"/>
+                            </p:stCondLst>
+                            <p:childTnLst>
+                              <p:par>
+                                <p:cTn id="5" presetID="10" presetClass="entr" presetSubtype="0" fill="hold" nodeType="clickEffect">
+                                  <p:stCondLst>
+                                    <p:cond delay="0"/>
+                                  </p:stCondLst>
+                                  <p:childTnLst>
+                                    <p:set>
+                                      <p:cBhvr>
+                                        <p:cTn id="6" dur="1" fill="hold">
+                                          <p:stCondLst>
+                                            <p:cond delay="0"/>
+                                          </p:stCondLst>
+                                        </p:cTn>
+                                        <p:tgtEl>
+                                          <p:spTgt spid="8"/>
+                                        </p:tgtEl>
+                                        <p:attrNameLst>
+                                          <p:attrName>style.visibility</p:attrName>
+                                        </p:attrNameLst>
+                                      </p:cBhvr>
+                                      <p:to>
+                                        <p:strVal val="visible"/>
+                                      </p:to>
+                                    </p:set>
+                                    <p:animEffect transition="in" filter="fade">
+                                      <p:cBhvr>
+                                        <p:cTn id="7" dur="300"/>
+                                        <p:tgtEl>
+                                          <p:spTgt spid="8"/>
+                                        </p:tgtEl>
+                                      </p:cBhvr>
+                                    </p:animEffect>
+                                  </p:childTnLst>
+                                </p:cTn>
+                              </p:par>
+                              <p:par>
+                                <p:cTn id="8" presetID="10" presetClass="exit" presetSubtype="0" fill="hold" nodeType="withEffect">
+                                  <p:stCondLst>
+                                    <p:cond delay="0"/>
+                                  </p:stCondLst>
+                                  <p:childTnLst>
+                                    <p:animEffect transition="out" filter="fade">
+                                      <p:cBhvr>
+                                        <p:cTn id="9" dur="300"/>
+                                        <p:tgtEl>
+                                          <p:spTgt spid="11"/>
+                                        </p:tgtEl>
+                                      </p:cBhvr>
+                                    </p:animEffect>
+                                    <p:set>
+                                      <p:cBhvr>
+                                        <p:cTn id="10" dur="1" fill="hold">
+                                          <p:stCondLst>
+                                            <p:cond delay="299"/>
+                                          </p:stCondLst>
+                                        </p:cTn>
+                                        <p:tgtEl>
+                                          <p:spTgt spid="11"/>
+                                        </p:tgtEl>
+                                        <p:attrNameLst>
+                                          <p:attrName>style.visibility</p:attrName>
+                                        </p:attrNameLst>
+                                      </p:cBhvr>
+                                      <p:to>
+                                        <p:strVal val="hidden"/>
+                                      </p:to>
+                                    </p:set>
+                                  </p:childTnLst>
+                                </p:cTn>
+                              </p:par>
+                            </p:childTnLst>
+                          </p:cTn>
+                        </p:par>
+                      </p:childTnLst>
+                    </p:cTn>
+                  </p:par>
+                </p:childTnLst>
+              </p:cTn>
+              <p:prevCondLst>
+                <p:cond evt="onPrev" delay="0">
+                  <p:tgtEl>
+                    <p:sldTgt/>
+                  </p:tgtEl>
+                </p:cond>
+              </p:prevCondLst>
+              <p:nextCondLst>
+                <p:cond evt="onNext" delay="0">
+                  <p:tgtEl>
+                    <p:sldTgt/>
+                  </p:tgtEl>
+                </p:cond>
+              </p:nextCondLst>
+            </p:seq>
+          </p:childTnLst>
+        </p:cTn>
+      </p:par>
+    </p:tnLst>
+  </p:timing>
+</p:sld>
+</file>
+
+<file path=ppt/slides/slide11.xml><?xml version="1.0" encoding="utf-8"?>
+<p:sld xmlns:a="http://schemas.openxmlformats.org/drawingml/2006/main" xmlns:r="http://schemas.openxmlformats.org/officeDocument/2006/relationships" xmlns:p="http://schemas.openxmlformats.org/presentationml/2006/main">
+  <p:cSld>
+    <p:spTree>
+      <p:nvGrpSpPr>
+        <p:cNvPr id="1" name=""/>
+        <p:cNvGrpSpPr/>
+        <p:nvPr/>
+      </p:nvGrpSpPr>
+      <p:grpSpPr>
+        <a:xfrm>
+          <a:off x="0" y="0"/>
+          <a:ext cx="0" cy="0"/>
+          <a:chOff x="0" y="0"/>
+          <a:chExt cx="0" cy="0"/>
+        </a:xfrm>
+      </p:grpSpPr>
+      <p:sp>
+        <p:nvSpPr>
+          <p:cNvPr id="2" name="Title 1">
+            <a:extLst>
+              <a:ext uri="{FF2B5EF4-FFF2-40B4-BE49-F238E27FC236}">
                 <a16:creationId xmlns:a16="http://schemas.microsoft.com/office/drawing/2014/main" id="{FA63CE58-31D3-4CE4-B980-300475A8D6AB}"/>
               </a:ext>
             </a:extLst>
@@ -2321,61 +2900,62 @@
           <a:p>
             <a:r>
               <a:rPr lang="en-GB" sz="2000" dirty="0"/>
-              <a:t>Introduction GUIs</a:t>
+              <a:t>Talk about plotting</a:t>
             </a:r>
           </a:p>
           <a:p>
             <a:pPr lvl="1"/>
             <a:r>
-              <a:rPr lang="en-GB" sz="1200" dirty="0"/>
-              <a:t>Why would we want them</a:t>
-            </a:r>
-          </a:p>
-          <a:p>
-            <a:pPr lvl="1"/>
-            <a:r>
-              <a:rPr lang="en-GB" sz="1200" dirty="0"/>
-              <a:t>What sort of thing could they include</a:t>
-            </a:r>
-          </a:p>
-          <a:p>
-            <a:pPr lvl="1"/>
-            <a:endParaRPr lang="en-GB" sz="1200" dirty="0"/>
-          </a:p>
-          <a:p>
-            <a:r>
-              <a:rPr lang="en-GB" sz="2000" dirty="0"/>
-              <a:t>Talk about adding control elements to GUIs in the context of a simple push button</a:t>
-            </a:r>
-          </a:p>
-          <a:p>
-            <a:pPr lvl="1"/>
-            <a:r>
-              <a:rPr lang="en-GB" sz="1100" dirty="0" err="1"/>
-              <a:t>Callback</a:t>
-            </a:r>
-            <a:r>
-              <a:rPr lang="en-GB" sz="1100" dirty="0"/>
-              <a:t> functions</a:t>
-            </a:r>
-          </a:p>
-          <a:p>
-            <a:pPr lvl="1"/>
-            <a:r>
-              <a:rPr lang="en-GB" sz="1100" dirty="0"/>
-              <a:t>Enable/disable</a:t>
-            </a:r>
-          </a:p>
-          <a:p>
-            <a:pPr lvl="1"/>
-            <a:r>
-              <a:rPr lang="en-GB" sz="1100" dirty="0"/>
-              <a:t>Visible/not visible</a:t>
+              <a:rPr lang="en-GB" sz="1800" dirty="0"/>
+              <a:t>Talk about main concepts using scatter plot</a:t>
             </a:r>
           </a:p>
           <a:p>
             <a:pPr lvl="2"/>
-            <a:endParaRPr lang="en-GB" sz="900" dirty="0"/>
+            <a:r>
+              <a:rPr lang="en-GB" sz="1400" dirty="0"/>
+              <a:t>The axes objects</a:t>
+            </a:r>
+          </a:p>
+          <a:p>
+            <a:pPr lvl="2"/>
+            <a:r>
+              <a:rPr lang="en-GB" sz="1400" dirty="0"/>
+              <a:t>Changing line properties</a:t>
+            </a:r>
+          </a:p>
+          <a:p>
+            <a:pPr lvl="2"/>
+            <a:r>
+              <a:rPr lang="en-GB" sz="1400" dirty="0"/>
+              <a:t>Changing marker types</a:t>
+            </a:r>
+          </a:p>
+          <a:p>
+            <a:pPr lvl="2"/>
+            <a:r>
+              <a:rPr lang="en-GB" sz="1400" dirty="0"/>
+              <a:t>The shorthand colour names (‘</a:t>
+            </a:r>
+            <a:r>
+              <a:rPr lang="en-GB" sz="1400" dirty="0" err="1"/>
+              <a:t>b’,’g’,’k</a:t>
+            </a:r>
+            <a:r>
+              <a:rPr lang="en-GB" sz="1400" dirty="0"/>
+              <a:t>’, etc.)</a:t>
+            </a:r>
+          </a:p>
+          <a:p>
+            <a:pPr lvl="2"/>
+            <a:r>
+              <a:rPr lang="en-GB" sz="1400" dirty="0"/>
+              <a:t>Using hold on and hold off to add elements to a plot</a:t>
+            </a:r>
+          </a:p>
+          <a:p>
+            <a:pPr lvl="2"/>
+            <a:endParaRPr lang="en-GB" sz="800" dirty="0"/>
           </a:p>
           <a:p>
             <a:pPr lvl="2"/>
@@ -2390,7 +2970,7 @@
     </p:spTree>
     <p:extLst>
       <p:ext uri="{BB962C8B-B14F-4D97-AF65-F5344CB8AC3E}">
-        <p14:creationId xmlns:p14="http://schemas.microsoft.com/office/powerpoint/2010/main" val="2789544707"/>
+        <p14:creationId xmlns:p14="http://schemas.microsoft.com/office/powerpoint/2010/main" val="616477775"/>
       </p:ext>
     </p:extLst>
   </p:cSld>
@@ -2412,7 +2992,7 @@
 </p:sld>
 </file>
 
-<file path=ppt/slides/slide11.xml><?xml version="1.0" encoding="utf-8"?>
+<file path=ppt/slides/slide12.xml><?xml version="1.0" encoding="utf-8"?>
 <p:sld xmlns:a="http://schemas.openxmlformats.org/drawingml/2006/main" xmlns:r="http://schemas.openxmlformats.org/officeDocument/2006/relationships" xmlns:p="http://schemas.openxmlformats.org/presentationml/2006/main">
   <p:cSld>
     <p:spTree>
@@ -2485,6 +3065,274 @@
             <a:pPr algn="ctr"/>
             <a:r>
               <a:rPr lang="en-GB" sz="3200" dirty="0"/>
+              <a:t>Designing a </a:t>
+            </a:r>
+            <a:r>
+              <a:rPr lang="en-GB" sz="3200"/>
+              <a:t>user interface</a:t>
+            </a:r>
+            <a:endParaRPr lang="en-GB" sz="2800" dirty="0">
+              <a:solidFill>
+                <a:schemeClr val="tx1"/>
+              </a:solidFill>
+            </a:endParaRPr>
+          </a:p>
+        </p:txBody>
+      </p:sp>
+    </p:spTree>
+    <p:extLst>
+      <p:ext uri="{BB962C8B-B14F-4D97-AF65-F5344CB8AC3E}">
+        <p14:creationId xmlns:p14="http://schemas.microsoft.com/office/powerpoint/2010/main" val="2590606000"/>
+      </p:ext>
+    </p:extLst>
+  </p:cSld>
+  <p:clrMapOvr>
+    <a:masterClrMapping/>
+  </p:clrMapOvr>
+  <mc:AlternateContent xmlns:mc="http://schemas.openxmlformats.org/markup-compatibility/2006" xmlns:p14="http://schemas.microsoft.com/office/powerpoint/2010/main">
+    <mc:Choice Requires="p14">
+      <p:transition p14:dur="300">
+        <p:fade/>
+      </p:transition>
+    </mc:Choice>
+    <mc:Fallback xmlns="">
+      <p:transition>
+        <p:fade/>
+      </p:transition>
+    </mc:Fallback>
+  </mc:AlternateContent>
+</p:sld>
+</file>
+
+<file path=ppt/slides/slide13.xml><?xml version="1.0" encoding="utf-8"?>
+<p:sld xmlns:a="http://schemas.openxmlformats.org/drawingml/2006/main" xmlns:r="http://schemas.openxmlformats.org/officeDocument/2006/relationships" xmlns:p="http://schemas.openxmlformats.org/presentationml/2006/main">
+  <p:cSld>
+    <p:spTree>
+      <p:nvGrpSpPr>
+        <p:cNvPr id="1" name=""/>
+        <p:cNvGrpSpPr/>
+        <p:nvPr/>
+      </p:nvGrpSpPr>
+      <p:grpSpPr>
+        <a:xfrm>
+          <a:off x="0" y="0"/>
+          <a:ext cx="0" cy="0"/>
+          <a:chOff x="0" y="0"/>
+          <a:chExt cx="0" cy="0"/>
+        </a:xfrm>
+      </p:grpSpPr>
+      <p:sp>
+        <p:nvSpPr>
+          <p:cNvPr id="2" name="Title 1">
+            <a:extLst>
+              <a:ext uri="{FF2B5EF4-FFF2-40B4-BE49-F238E27FC236}">
+                <a16:creationId xmlns:a16="http://schemas.microsoft.com/office/drawing/2014/main" id="{FA63CE58-31D3-4CE4-B980-300475A8D6AB}"/>
+              </a:ext>
+            </a:extLst>
+          </p:cNvPr>
+          <p:cNvSpPr>
+            <a:spLocks noGrp="1"/>
+          </p:cNvSpPr>
+          <p:nvPr>
+            <p:ph type="title"/>
+          </p:nvPr>
+        </p:nvSpPr>
+        <p:spPr/>
+        <p:txBody>
+          <a:bodyPr/>
+          <a:lstStyle/>
+          <a:p>
+            <a:endParaRPr lang="en-GB"/>
+          </a:p>
+        </p:txBody>
+      </p:sp>
+      <p:sp>
+        <p:nvSpPr>
+          <p:cNvPr id="3" name="Content Placeholder 2">
+            <a:extLst>
+              <a:ext uri="{FF2B5EF4-FFF2-40B4-BE49-F238E27FC236}">
+                <a16:creationId xmlns:a16="http://schemas.microsoft.com/office/drawing/2014/main" id="{D547804F-4C36-4E05-A85C-C0624CAF1BA9}"/>
+              </a:ext>
+            </a:extLst>
+          </p:cNvPr>
+          <p:cNvSpPr>
+            <a:spLocks noGrp="1"/>
+          </p:cNvSpPr>
+          <p:nvPr>
+            <p:ph idx="1"/>
+          </p:nvPr>
+        </p:nvSpPr>
+        <p:spPr/>
+        <p:txBody>
+          <a:bodyPr/>
+          <a:lstStyle/>
+          <a:p>
+            <a:r>
+              <a:rPr lang="en-GB" sz="2000" dirty="0"/>
+              <a:t>Introduction GUIs</a:t>
+            </a:r>
+          </a:p>
+          <a:p>
+            <a:pPr lvl="1"/>
+            <a:r>
+              <a:rPr lang="en-GB" sz="1200" dirty="0"/>
+              <a:t>Why would we want them</a:t>
+            </a:r>
+          </a:p>
+          <a:p>
+            <a:pPr lvl="1"/>
+            <a:r>
+              <a:rPr lang="en-GB" sz="1200" dirty="0"/>
+              <a:t>What sort of thing could they include</a:t>
+            </a:r>
+          </a:p>
+          <a:p>
+            <a:pPr lvl="1"/>
+            <a:endParaRPr lang="en-GB" sz="1200" dirty="0"/>
+          </a:p>
+          <a:p>
+            <a:r>
+              <a:rPr lang="en-GB" sz="2000" dirty="0"/>
+              <a:t>Talk about adding control elements to GUIs in the context of a simple push button</a:t>
+            </a:r>
+          </a:p>
+          <a:p>
+            <a:pPr lvl="1"/>
+            <a:r>
+              <a:rPr lang="en-GB" sz="1100" dirty="0" err="1"/>
+              <a:t>Callback</a:t>
+            </a:r>
+            <a:r>
+              <a:rPr lang="en-GB" sz="1100" dirty="0"/>
+              <a:t> functions</a:t>
+            </a:r>
+          </a:p>
+          <a:p>
+            <a:pPr lvl="1"/>
+            <a:r>
+              <a:rPr lang="en-GB" sz="1100" dirty="0"/>
+              <a:t>Enable/disable</a:t>
+            </a:r>
+          </a:p>
+          <a:p>
+            <a:pPr lvl="1"/>
+            <a:r>
+              <a:rPr lang="en-GB" sz="1100" dirty="0"/>
+              <a:t>Visible/not visible</a:t>
+            </a:r>
+          </a:p>
+          <a:p>
+            <a:pPr lvl="2"/>
+            <a:endParaRPr lang="en-GB" sz="900" dirty="0"/>
+          </a:p>
+          <a:p>
+            <a:pPr lvl="2"/>
+            <a:endParaRPr lang="en-GB" sz="1100" dirty="0"/>
+          </a:p>
+          <a:p>
+            <a:pPr lvl="2"/>
+            <a:endParaRPr lang="en-GB" sz="600" dirty="0"/>
+          </a:p>
+        </p:txBody>
+      </p:sp>
+    </p:spTree>
+    <p:extLst>
+      <p:ext uri="{BB962C8B-B14F-4D97-AF65-F5344CB8AC3E}">
+        <p14:creationId xmlns:p14="http://schemas.microsoft.com/office/powerpoint/2010/main" val="2789544707"/>
+      </p:ext>
+    </p:extLst>
+  </p:cSld>
+  <p:clrMapOvr>
+    <a:masterClrMapping/>
+  </p:clrMapOvr>
+  <mc:AlternateContent xmlns:mc="http://schemas.openxmlformats.org/markup-compatibility/2006" xmlns:p14="http://schemas.microsoft.com/office/powerpoint/2010/main">
+    <mc:Choice Requires="p14">
+      <p:transition p14:dur="300">
+        <p:fade/>
+      </p:transition>
+    </mc:Choice>
+    <mc:Fallback xmlns="">
+      <p:transition>
+        <p:fade/>
+      </p:transition>
+    </mc:Fallback>
+  </mc:AlternateContent>
+</p:sld>
+</file>
+
+<file path=ppt/slides/slide14.xml><?xml version="1.0" encoding="utf-8"?>
+<p:sld xmlns:a="http://schemas.openxmlformats.org/drawingml/2006/main" xmlns:r="http://schemas.openxmlformats.org/officeDocument/2006/relationships" xmlns:p="http://schemas.openxmlformats.org/presentationml/2006/main">
+  <p:cSld>
+    <p:spTree>
+      <p:nvGrpSpPr>
+        <p:cNvPr id="1" name=""/>
+        <p:cNvGrpSpPr/>
+        <p:nvPr/>
+      </p:nvGrpSpPr>
+      <p:grpSpPr>
+        <a:xfrm>
+          <a:off x="0" y="0"/>
+          <a:ext cx="0" cy="0"/>
+          <a:chOff x="0" y="0"/>
+          <a:chExt cx="0" cy="0"/>
+        </a:xfrm>
+      </p:grpSpPr>
+      <p:sp>
+        <p:nvSpPr>
+          <p:cNvPr id="2" name="Title 1">
+            <a:extLst>
+              <a:ext uri="{FF2B5EF4-FFF2-40B4-BE49-F238E27FC236}">
+                <a16:creationId xmlns:a16="http://schemas.microsoft.com/office/drawing/2014/main" id="{8EEF9218-B50A-424A-A99D-57BA08F4A8E3}"/>
+              </a:ext>
+            </a:extLst>
+          </p:cNvPr>
+          <p:cNvSpPr>
+            <a:spLocks noGrp="1"/>
+          </p:cNvSpPr>
+          <p:nvPr>
+            <p:ph type="title"/>
+          </p:nvPr>
+        </p:nvSpPr>
+        <p:spPr/>
+        <p:txBody>
+          <a:bodyPr/>
+          <a:lstStyle/>
+          <a:p>
+            <a:endParaRPr lang="en-GB" dirty="0"/>
+          </a:p>
+        </p:txBody>
+      </p:sp>
+      <p:sp>
+        <p:nvSpPr>
+          <p:cNvPr id="4" name="TextBox 3">
+            <a:extLst>
+              <a:ext uri="{FF2B5EF4-FFF2-40B4-BE49-F238E27FC236}">
+                <a16:creationId xmlns:a16="http://schemas.microsoft.com/office/drawing/2014/main" id="{31426854-EE0B-4A5A-AC6D-2BF50C4B1D90}"/>
+              </a:ext>
+            </a:extLst>
+          </p:cNvPr>
+          <p:cNvSpPr txBox="1"/>
+          <p:nvPr/>
+        </p:nvSpPr>
+        <p:spPr>
+          <a:xfrm>
+            <a:off x="2052408" y="3136612"/>
+            <a:ext cx="8087183" cy="584775"/>
+          </a:xfrm>
+          <a:prstGeom prst="rect">
+            <a:avLst/>
+          </a:prstGeom>
+          <a:noFill/>
+        </p:spPr>
+        <p:txBody>
+          <a:bodyPr wrap="square" rtlCol="0">
+            <a:spAutoFit/>
+          </a:bodyPr>
+          <a:lstStyle/>
+          <a:p>
+            <a:pPr algn="ctr"/>
+            <a:r>
+              <a:rPr lang="en-GB" sz="3200" dirty="0"/>
               <a:t>Questions?!</a:t>
             </a:r>
             <a:endParaRPr lang="en-GB" sz="2800" dirty="0">
@@ -2520,7 +3368,7 @@
 </p:sld>
 </file>
 
-<file path=ppt/slides/slide12.xml><?xml version="1.0" encoding="utf-8"?>
+<file path=ppt/slides/slide15.xml><?xml version="1.0" encoding="utf-8"?>
 <p:sld xmlns:a="http://schemas.openxmlformats.org/drawingml/2006/main" xmlns:r="http://schemas.openxmlformats.org/officeDocument/2006/relationships" xmlns:p="http://schemas.openxmlformats.org/presentationml/2006/main">
   <p:cSld>
     <p:spTree>
@@ -4190,28 +5038,21 @@
           <a:lstStyle/>
           <a:p>
             <a:r>
-              <a:rPr lang="en-GB" sz="1800" dirty="0"/>
+              <a:rPr lang="en-GB" sz="1800" strike="sngStrike" dirty="0"/>
               <a:t>Already seen the figure window</a:t>
             </a:r>
           </a:p>
           <a:p>
             <a:pPr lvl="1"/>
             <a:r>
-              <a:rPr lang="en-GB" sz="1600" dirty="0"/>
+              <a:rPr lang="en-GB" sz="1600" strike="sngStrike" dirty="0"/>
               <a:t>This is main component of all GUI elements.</a:t>
             </a:r>
           </a:p>
           <a:p>
             <a:pPr lvl="1"/>
             <a:r>
-              <a:rPr lang="en-GB" sz="1600" dirty="0"/>
-              <a:t>Includes key window handling elements (minimize, maximize, close, drag to move)</a:t>
-            </a:r>
-          </a:p>
-          <a:p>
-            <a:pPr lvl="1"/>
-            <a:r>
-              <a:rPr lang="en-GB" sz="1600" dirty="0"/>
+              <a:rPr lang="en-GB" sz="1600" strike="sngStrike" dirty="0"/>
               <a:t>Figures are objects (as covered in Session 3).  Mention some properties</a:t>
             </a:r>
           </a:p>
@@ -4224,21 +5065,21 @@
           <a:p>
             <a:pPr lvl="1"/>
             <a:r>
-              <a:rPr lang="en-GB" sz="1600" dirty="0"/>
+              <a:rPr lang="en-GB" sz="1600" strike="sngStrike" dirty="0"/>
               <a:t>Images</a:t>
             </a:r>
           </a:p>
           <a:p>
             <a:pPr lvl="2"/>
             <a:r>
-              <a:rPr lang="en-GB" sz="1400" dirty="0"/>
+              <a:rPr lang="en-GB" sz="1400" strike="sngStrike" dirty="0"/>
               <a:t>Display array of pixels by their intensity</a:t>
             </a:r>
           </a:p>
           <a:p>
             <a:pPr lvl="2"/>
             <a:r>
-              <a:rPr lang="en-GB" sz="1400" dirty="0"/>
+              <a:rPr lang="en-GB" sz="1400" strike="sngStrike" dirty="0"/>
               <a:t>Maybe cover some extra functionality?  Not sure if there’s anything particularly interesting</a:t>
             </a:r>
           </a:p>
@@ -4271,6 +5112,13 @@
             </a:r>
           </a:p>
           <a:p>
+            <a:pPr lvl="2"/>
+            <a:r>
+              <a:rPr lang="en-GB" sz="1400" dirty="0"/>
+              <a:t>When talking about properties include axis labels, title, tick marks</a:t>
+            </a:r>
+          </a:p>
+          <a:p>
             <a:pPr lvl="1"/>
             <a:r>
               <a:rPr lang="en-GB" sz="1800" dirty="0"/>
@@ -4298,8 +5146,11 @@
             </a:r>
           </a:p>
           <a:p>
-            <a:pPr lvl="2"/>
-            <a:endParaRPr lang="en-GB" sz="1400" dirty="0"/>
+            <a:pPr lvl="1"/>
+            <a:r>
+              <a:rPr lang="en-GB" sz="1800" dirty="0"/>
+              <a:t>Talk about graphical element hierarchy (parent-child relationship)</a:t>
+            </a:r>
           </a:p>
         </p:txBody>
       </p:sp>
@@ -4350,7 +5201,7 @@
           <p:cNvPr id="2" name="Title 1">
             <a:extLst>
               <a:ext uri="{FF2B5EF4-FFF2-40B4-BE49-F238E27FC236}">
-                <a16:creationId xmlns:a16="http://schemas.microsoft.com/office/drawing/2014/main" id="{FA63CE58-31D3-4CE4-B980-300475A8D6AB}"/>
+                <a16:creationId xmlns:a16="http://schemas.microsoft.com/office/drawing/2014/main" id="{75D50EB5-46DE-4076-9A04-453EF016722F}"/>
               </a:ext>
             </a:extLst>
           </p:cNvPr>
@@ -4366,7 +5217,10 @@
           <a:bodyPr/>
           <a:lstStyle/>
           <a:p>
-            <a:endParaRPr lang="en-GB"/>
+            <a:r>
+              <a:rPr lang="en-GB" dirty="0"/>
+              <a:t>Introduction to figures</a:t>
+            </a:r>
           </a:p>
         </p:txBody>
       </p:sp>
@@ -4375,7 +5229,7 @@
           <p:cNvPr id="3" name="Content Placeholder 2">
             <a:extLst>
               <a:ext uri="{FF2B5EF4-FFF2-40B4-BE49-F238E27FC236}">
-                <a16:creationId xmlns:a16="http://schemas.microsoft.com/office/drawing/2014/main" id="{D547804F-4C36-4E05-A85C-C0624CAF1BA9}"/>
+                <a16:creationId xmlns:a16="http://schemas.microsoft.com/office/drawing/2014/main" id="{4863AB74-B352-493F-BE21-42319B6CF008}"/>
               </a:ext>
             </a:extLst>
           </p:cNvPr>
@@ -4392,35 +5246,312 @@
           <a:lstStyle/>
           <a:p>
             <a:r>
-              <a:rPr lang="en-GB" sz="1800" dirty="0"/>
-              <a:t>Recap using images in figures</a:t>
-            </a:r>
-          </a:p>
-          <a:p>
-            <a:r>
-              <a:rPr lang="en-GB" sz="1800" dirty="0"/>
-              <a:t>Mention </a:t>
-            </a:r>
-            <a:r>
-              <a:rPr lang="en-GB" sz="1800" dirty="0" err="1"/>
-              <a:t>imshow</a:t>
-            </a:r>
-            <a:r>
-              <a:rPr lang="en-GB" sz="1800" dirty="0"/>
-              <a:t> will write into most recently-opened window</a:t>
-            </a:r>
-            <a:endParaRPr lang="en-GB" sz="1600" dirty="0"/>
+              <a:rPr lang="en-GB" dirty="0"/>
+              <a:t>All graphical components live within a figure</a:t>
+            </a:r>
+          </a:p>
+          <a:p>
+            <a:pPr lvl="1"/>
+            <a:r>
+              <a:rPr lang="en-GB" dirty="0"/>
+              <a:t>The </a:t>
+            </a:r>
+            <a:r>
+              <a:rPr lang="en-GB" i="1" dirty="0">
+                <a:solidFill>
+                  <a:schemeClr val="accent1"/>
+                </a:solidFill>
+              </a:rPr>
+              <a:t>figure</a:t>
+            </a:r>
+            <a:r>
+              <a:rPr lang="en-GB" dirty="0"/>
+              <a:t> object is simply a container window</a:t>
+            </a:r>
+          </a:p>
+          <a:p>
+            <a:pPr lvl="1"/>
+            <a:endParaRPr lang="en-GB" sz="1200" dirty="0"/>
+          </a:p>
+          <a:p>
+            <a:r>
+              <a:rPr lang="en-GB" dirty="0"/>
+              <a:t>A figure is an object (Session 3)</a:t>
+            </a:r>
+          </a:p>
+          <a:p>
+            <a:pPr lvl="1"/>
+            <a:r>
+              <a:rPr lang="en-GB" dirty="0"/>
+              <a:t>Properties include</a:t>
+            </a:r>
           </a:p>
           <a:p>
             <a:pPr lvl="2"/>
-            <a:endParaRPr lang="en-GB" sz="1400" dirty="0"/>
+            <a:r>
+              <a:rPr lang="en-GB" dirty="0"/>
+              <a:t>Name (title)</a:t>
+            </a:r>
+          </a:p>
+          <a:p>
+            <a:pPr lvl="2"/>
+            <a:r>
+              <a:rPr lang="en-GB" dirty="0"/>
+              <a:t>Position</a:t>
+            </a:r>
+          </a:p>
+          <a:p>
+            <a:pPr lvl="1"/>
+            <a:r>
+              <a:rPr lang="en-GB" dirty="0"/>
+              <a:t>Methods include</a:t>
+            </a:r>
+          </a:p>
+          <a:p>
+            <a:pPr lvl="2"/>
+            <a:r>
+              <a:rPr lang="en-GB" dirty="0"/>
+              <a:t>delete (close window)</a:t>
+            </a:r>
+          </a:p>
+          <a:p>
+            <a:pPr lvl="2"/>
+            <a:endParaRPr lang="en-GB" sz="1200" dirty="0"/>
+          </a:p>
+          <a:p>
+            <a:r>
+              <a:rPr lang="en-GB" dirty="0"/>
+              <a:t>We’ve used figures when viewing images</a:t>
+            </a:r>
+          </a:p>
+          <a:p>
+            <a:pPr lvl="1"/>
+            <a:endParaRPr lang="en-GB" dirty="0"/>
+          </a:p>
+          <a:p>
+            <a:pPr lvl="1"/>
+            <a:endParaRPr lang="en-GB" dirty="0"/>
           </a:p>
         </p:txBody>
       </p:sp>
+      <p:grpSp>
+        <p:nvGrpSpPr>
+          <p:cNvPr id="11" name="Group 10">
+            <a:extLst>
+              <a:ext uri="{FF2B5EF4-FFF2-40B4-BE49-F238E27FC236}">
+                <a16:creationId xmlns:a16="http://schemas.microsoft.com/office/drawing/2014/main" id="{B5B14166-21E1-405F-8DE1-33B9B26EAEDB}"/>
+              </a:ext>
+            </a:extLst>
+          </p:cNvPr>
+          <p:cNvGrpSpPr/>
+          <p:nvPr/>
+        </p:nvGrpSpPr>
+        <p:grpSpPr>
+          <a:xfrm>
+            <a:off x="7627904" y="1502891"/>
+            <a:ext cx="4293659" cy="4198718"/>
+            <a:chOff x="7627904" y="1329641"/>
+            <a:chExt cx="4293659" cy="4198718"/>
+          </a:xfrm>
+        </p:grpSpPr>
+        <p:pic>
+          <p:nvPicPr>
+            <p:cNvPr id="6" name="Picture 5">
+              <a:extLst>
+                <a:ext uri="{FF2B5EF4-FFF2-40B4-BE49-F238E27FC236}">
+                  <a16:creationId xmlns:a16="http://schemas.microsoft.com/office/drawing/2014/main" id="{D6404EE0-28F7-41D7-8C3D-AFA856BA805B}"/>
+                </a:ext>
+              </a:extLst>
+            </p:cNvPr>
+            <p:cNvPicPr>
+              <a:picLocks noChangeAspect="1"/>
+            </p:cNvPicPr>
+            <p:nvPr/>
+          </p:nvPicPr>
+          <p:blipFill>
+            <a:blip r:embed="rId2"/>
+            <a:stretch>
+              <a:fillRect/>
+            </a:stretch>
+          </p:blipFill>
+          <p:spPr>
+            <a:xfrm>
+              <a:off x="7793534" y="1794559"/>
+              <a:ext cx="3962400" cy="3733800"/>
+            </a:xfrm>
+            <a:prstGeom prst="rect">
+              <a:avLst/>
+            </a:prstGeom>
+          </p:spPr>
+        </p:pic>
+        <p:sp>
+          <p:nvSpPr>
+            <p:cNvPr id="7" name="TextBox 6">
+              <a:extLst>
+                <a:ext uri="{FF2B5EF4-FFF2-40B4-BE49-F238E27FC236}">
+                  <a16:creationId xmlns:a16="http://schemas.microsoft.com/office/drawing/2014/main" id="{ADA550D8-92F7-4DFB-94B4-961CBEDD9540}"/>
+                </a:ext>
+              </a:extLst>
+            </p:cNvPr>
+            <p:cNvSpPr txBox="1"/>
+            <p:nvPr/>
+          </p:nvSpPr>
+          <p:spPr>
+            <a:xfrm>
+              <a:off x="7627904" y="1329641"/>
+              <a:ext cx="4293659" cy="461665"/>
+            </a:xfrm>
+            <a:prstGeom prst="rect">
+              <a:avLst/>
+            </a:prstGeom>
+            <a:noFill/>
+          </p:spPr>
+          <p:txBody>
+            <a:bodyPr wrap="square" rtlCol="0">
+              <a:spAutoFit/>
+            </a:bodyPr>
+            <a:lstStyle/>
+            <a:p>
+              <a:pPr algn="ctr"/>
+              <a:r>
+                <a:rPr lang="en-GB" sz="2400" i="1" dirty="0" err="1">
+                  <a:solidFill>
+                    <a:schemeClr val="accent1"/>
+                  </a:solidFill>
+                </a:rPr>
+                <a:t>my_fig</a:t>
+              </a:r>
+              <a:r>
+                <a:rPr lang="en-GB" sz="2400" i="1" dirty="0">
+                  <a:solidFill>
+                    <a:schemeClr val="accent1"/>
+                  </a:solidFill>
+                </a:rPr>
+                <a:t> = figure()</a:t>
+              </a:r>
+            </a:p>
+          </p:txBody>
+        </p:sp>
+      </p:grpSp>
+      <p:grpSp>
+        <p:nvGrpSpPr>
+          <p:cNvPr id="8" name="Group 7">
+            <a:extLst>
+              <a:ext uri="{FF2B5EF4-FFF2-40B4-BE49-F238E27FC236}">
+                <a16:creationId xmlns:a16="http://schemas.microsoft.com/office/drawing/2014/main" id="{AC97AE24-DA52-4AFC-AD93-39609E8F1285}"/>
+              </a:ext>
+            </a:extLst>
+          </p:cNvPr>
+          <p:cNvGrpSpPr/>
+          <p:nvPr/>
+        </p:nvGrpSpPr>
+        <p:grpSpPr>
+          <a:xfrm>
+            <a:off x="7627904" y="1502891"/>
+            <a:ext cx="4293659" cy="4198718"/>
+            <a:chOff x="7627904" y="1329641"/>
+            <a:chExt cx="4293659" cy="4198718"/>
+          </a:xfrm>
+        </p:grpSpPr>
+        <p:pic>
+          <p:nvPicPr>
+            <p:cNvPr id="9" name="Picture 8">
+              <a:extLst>
+                <a:ext uri="{FF2B5EF4-FFF2-40B4-BE49-F238E27FC236}">
+                  <a16:creationId xmlns:a16="http://schemas.microsoft.com/office/drawing/2014/main" id="{A36E4B39-FE4F-4F6B-84EA-CE5063ABE2B9}"/>
+                </a:ext>
+              </a:extLst>
+            </p:cNvPr>
+            <p:cNvPicPr>
+              <a:picLocks noChangeAspect="1"/>
+            </p:cNvPicPr>
+            <p:nvPr/>
+          </p:nvPicPr>
+          <p:blipFill>
+            <a:blip r:embed="rId3"/>
+            <a:stretch>
+              <a:fillRect/>
+            </a:stretch>
+          </p:blipFill>
+          <p:spPr>
+            <a:xfrm>
+              <a:off x="7793534" y="1794559"/>
+              <a:ext cx="3962400" cy="3733800"/>
+            </a:xfrm>
+            <a:prstGeom prst="rect">
+              <a:avLst/>
+            </a:prstGeom>
+          </p:spPr>
+        </p:pic>
+        <p:sp>
+          <p:nvSpPr>
+            <p:cNvPr id="10" name="TextBox 9">
+              <a:extLst>
+                <a:ext uri="{FF2B5EF4-FFF2-40B4-BE49-F238E27FC236}">
+                  <a16:creationId xmlns:a16="http://schemas.microsoft.com/office/drawing/2014/main" id="{55BF7ECA-2638-4787-9329-BE5C2980F730}"/>
+                </a:ext>
+              </a:extLst>
+            </p:cNvPr>
+            <p:cNvSpPr txBox="1"/>
+            <p:nvPr/>
+          </p:nvSpPr>
+          <p:spPr>
+            <a:xfrm>
+              <a:off x="7627904" y="1329641"/>
+              <a:ext cx="4293659" cy="461665"/>
+            </a:xfrm>
+            <a:prstGeom prst="rect">
+              <a:avLst/>
+            </a:prstGeom>
+            <a:noFill/>
+          </p:spPr>
+          <p:txBody>
+            <a:bodyPr wrap="square" rtlCol="0">
+              <a:spAutoFit/>
+            </a:bodyPr>
+            <a:lstStyle/>
+            <a:p>
+              <a:pPr algn="ctr"/>
+              <a:r>
+                <a:rPr lang="en-GB" sz="2400" i="1" dirty="0" err="1">
+                  <a:solidFill>
+                    <a:schemeClr val="accent1"/>
+                  </a:solidFill>
+                </a:rPr>
+                <a:t>imshow</a:t>
+              </a:r>
+              <a:r>
+                <a:rPr lang="en-GB" sz="2400" i="1" dirty="0">
+                  <a:solidFill>
+                    <a:schemeClr val="accent1"/>
+                  </a:solidFill>
+                </a:rPr>
+                <a:t>(</a:t>
+              </a:r>
+              <a:r>
+                <a:rPr lang="en-GB" sz="2400" i="1" dirty="0" err="1">
+                  <a:solidFill>
+                    <a:schemeClr val="accent1"/>
+                  </a:solidFill>
+                </a:rPr>
+                <a:t>some_image</a:t>
+              </a:r>
+              <a:r>
+                <a:rPr lang="en-GB" sz="2400" i="1" dirty="0">
+                  <a:solidFill>
+                    <a:schemeClr val="accent1"/>
+                  </a:solidFill>
+                </a:rPr>
+                <a:t>, [])</a:t>
+              </a:r>
+            </a:p>
+          </p:txBody>
+        </p:sp>
+      </p:grpSp>
     </p:spTree>
     <p:extLst>
       <p:ext uri="{BB962C8B-B14F-4D97-AF65-F5344CB8AC3E}">
-        <p14:creationId xmlns:p14="http://schemas.microsoft.com/office/powerpoint/2010/main" val="1649494502"/>
+        <p14:creationId xmlns:p14="http://schemas.microsoft.com/office/powerpoint/2010/main" val="3783631094"/>
       </p:ext>
     </p:extLst>
   </p:cSld>
@@ -4439,6 +5570,124 @@
       </p:transition>
     </mc:Fallback>
   </mc:AlternateContent>
+  <p:timing>
+    <p:tnLst>
+      <p:par>
+        <p:cTn id="1" dur="indefinite" restart="never" nodeType="tmRoot">
+          <p:childTnLst>
+            <p:seq concurrent="1" nextAc="seek">
+              <p:cTn id="2" dur="indefinite" nodeType="mainSeq">
+                <p:childTnLst>
+                  <p:par>
+                    <p:cTn id="3" fill="hold">
+                      <p:stCondLst>
+                        <p:cond delay="indefinite"/>
+                      </p:stCondLst>
+                      <p:childTnLst>
+                        <p:par>
+                          <p:cTn id="4" fill="hold">
+                            <p:stCondLst>
+                              <p:cond delay="0"/>
+                            </p:stCondLst>
+                            <p:childTnLst>
+                              <p:par>
+                                <p:cTn id="5" presetID="10" presetClass="entr" presetSubtype="0" fill="hold" nodeType="clickEffect">
+                                  <p:stCondLst>
+                                    <p:cond delay="0"/>
+                                  </p:stCondLst>
+                                  <p:childTnLst>
+                                    <p:set>
+                                      <p:cBhvr>
+                                        <p:cTn id="6" dur="1" fill="hold">
+                                          <p:stCondLst>
+                                            <p:cond delay="0"/>
+                                          </p:stCondLst>
+                                        </p:cTn>
+                                        <p:tgtEl>
+                                          <p:spTgt spid="8"/>
+                                        </p:tgtEl>
+                                        <p:attrNameLst>
+                                          <p:attrName>style.visibility</p:attrName>
+                                        </p:attrNameLst>
+                                      </p:cBhvr>
+                                      <p:to>
+                                        <p:strVal val="visible"/>
+                                      </p:to>
+                                    </p:set>
+                                    <p:animEffect transition="in" filter="fade">
+                                      <p:cBhvr>
+                                        <p:cTn id="7" dur="300"/>
+                                        <p:tgtEl>
+                                          <p:spTgt spid="8"/>
+                                        </p:tgtEl>
+                                      </p:cBhvr>
+                                    </p:animEffect>
+                                  </p:childTnLst>
+                                </p:cTn>
+                              </p:par>
+                              <p:par>
+                                <p:cTn id="8" presetID="10" presetClass="exit" presetSubtype="0" fill="hold" nodeType="withEffect">
+                                  <p:stCondLst>
+                                    <p:cond delay="0"/>
+                                  </p:stCondLst>
+                                  <p:childTnLst>
+                                    <p:animEffect transition="out" filter="fade">
+                                      <p:cBhvr>
+                                        <p:cTn id="9" dur="300"/>
+                                        <p:tgtEl>
+                                          <p:spTgt spid="11"/>
+                                        </p:tgtEl>
+                                      </p:cBhvr>
+                                    </p:animEffect>
+                                    <p:set>
+                                      <p:cBhvr>
+                                        <p:cTn id="10" dur="1" fill="hold">
+                                          <p:stCondLst>
+                                            <p:cond delay="299"/>
+                                          </p:stCondLst>
+                                        </p:cTn>
+                                        <p:tgtEl>
+                                          <p:spTgt spid="11"/>
+                                        </p:tgtEl>
+                                        <p:attrNameLst>
+                                          <p:attrName>style.visibility</p:attrName>
+                                        </p:attrNameLst>
+                                      </p:cBhvr>
+                                      <p:to>
+                                        <p:strVal val="hidden"/>
+                                      </p:to>
+                                    </p:set>
+                                  </p:childTnLst>
+                                </p:cTn>
+                              </p:par>
+                            </p:childTnLst>
+                          </p:cTn>
+                        </p:par>
+                      </p:childTnLst>
+                    </p:cTn>
+                  </p:par>
+                </p:childTnLst>
+              </p:cTn>
+              <p:prevCondLst>
+                <p:cond evt="onPrev" delay="0">
+                  <p:tgtEl>
+                    <p:sldTgt/>
+                  </p:tgtEl>
+                </p:cond>
+              </p:prevCondLst>
+              <p:nextCondLst>
+                <p:cond evt="onNext" delay="0">
+                  <p:tgtEl>
+                    <p:sldTgt/>
+                  </p:tgtEl>
+                </p:cond>
+              </p:nextCondLst>
+            </p:seq>
+          </p:childTnLst>
+        </p:cTn>
+      </p:par>
+    </p:tnLst>
+  </p:timing>
 </p:sld>
 </file>
 
@@ -4459,12 +5708,42 @@
           <a:chExt cx="0" cy="0"/>
         </a:xfrm>
       </p:grpSpPr>
+      <p:pic>
+        <p:nvPicPr>
+          <p:cNvPr id="13" name="Picture 12">
+            <a:extLst>
+              <a:ext uri="{FF2B5EF4-FFF2-40B4-BE49-F238E27FC236}">
+                <a16:creationId xmlns:a16="http://schemas.microsoft.com/office/drawing/2014/main" id="{A7549F0A-DD55-4E0B-BD01-643956E6A4C4}"/>
+              </a:ext>
+            </a:extLst>
+          </p:cNvPr>
+          <p:cNvPicPr>
+            <a:picLocks noChangeAspect="1"/>
+          </p:cNvPicPr>
+          <p:nvPr/>
+        </p:nvPicPr>
+        <p:blipFill>
+          <a:blip r:embed="rId3"/>
+          <a:stretch>
+            <a:fillRect/>
+          </a:stretch>
+        </p:blipFill>
+        <p:spPr>
+          <a:xfrm>
+            <a:off x="4114802" y="1958184"/>
+            <a:ext cx="3962400" cy="3733800"/>
+          </a:xfrm>
+          <a:prstGeom prst="rect">
+            <a:avLst/>
+          </a:prstGeom>
+        </p:spPr>
+      </p:pic>
       <p:sp>
         <p:nvSpPr>
           <p:cNvPr id="2" name="Title 1">
             <a:extLst>
               <a:ext uri="{FF2B5EF4-FFF2-40B4-BE49-F238E27FC236}">
-                <a16:creationId xmlns:a16="http://schemas.microsoft.com/office/drawing/2014/main" id="{8EEF9218-B50A-424A-A99D-57BA08F4A8E3}"/>
+                <a16:creationId xmlns:a16="http://schemas.microsoft.com/office/drawing/2014/main" id="{CA51F0EF-B0EE-450F-8AD0-F623966A7898}"/>
               </a:ext>
             </a:extLst>
           </p:cNvPr>
@@ -4480,16 +5759,110 @@
           <a:bodyPr/>
           <a:lstStyle/>
           <a:p>
-            <a:endParaRPr lang="en-GB" dirty="0"/>
+            <a:r>
+              <a:rPr lang="en-GB" dirty="0"/>
+              <a:t>What can go in a figure?</a:t>
+            </a:r>
           </a:p>
         </p:txBody>
       </p:sp>
+      <p:grpSp>
+        <p:nvGrpSpPr>
+          <p:cNvPr id="4" name="Group 3">
+            <a:extLst>
+              <a:ext uri="{FF2B5EF4-FFF2-40B4-BE49-F238E27FC236}">
+                <a16:creationId xmlns:a16="http://schemas.microsoft.com/office/drawing/2014/main" id="{4CF62D61-C4DA-49BE-B5CF-FA4C2B70B5E4}"/>
+              </a:ext>
+            </a:extLst>
+          </p:cNvPr>
+          <p:cNvGrpSpPr/>
+          <p:nvPr/>
+        </p:nvGrpSpPr>
+        <p:grpSpPr>
+          <a:xfrm>
+            <a:off x="91323" y="1493266"/>
+            <a:ext cx="4293659" cy="4198718"/>
+            <a:chOff x="7627904" y="1329641"/>
+            <a:chExt cx="4293659" cy="4198718"/>
+          </a:xfrm>
+        </p:grpSpPr>
+        <p:pic>
+          <p:nvPicPr>
+            <p:cNvPr id="5" name="Picture 4">
+              <a:extLst>
+                <a:ext uri="{FF2B5EF4-FFF2-40B4-BE49-F238E27FC236}">
+                  <a16:creationId xmlns:a16="http://schemas.microsoft.com/office/drawing/2014/main" id="{E63D4C95-E9E7-44B5-9A70-9774535E5A65}"/>
+                </a:ext>
+              </a:extLst>
+            </p:cNvPr>
+            <p:cNvPicPr>
+              <a:picLocks noChangeAspect="1"/>
+            </p:cNvPicPr>
+            <p:nvPr/>
+          </p:nvPicPr>
+          <p:blipFill>
+            <a:blip r:embed="rId4"/>
+            <a:stretch>
+              <a:fillRect/>
+            </a:stretch>
+          </p:blipFill>
+          <p:spPr>
+            <a:xfrm>
+              <a:off x="7793534" y="1794559"/>
+              <a:ext cx="3962400" cy="3733800"/>
+            </a:xfrm>
+            <a:prstGeom prst="rect">
+              <a:avLst/>
+            </a:prstGeom>
+          </p:spPr>
+        </p:pic>
+        <p:sp>
+          <p:nvSpPr>
+            <p:cNvPr id="6" name="TextBox 5">
+              <a:extLst>
+                <a:ext uri="{FF2B5EF4-FFF2-40B4-BE49-F238E27FC236}">
+                  <a16:creationId xmlns:a16="http://schemas.microsoft.com/office/drawing/2014/main" id="{29833A48-E011-4932-918C-D7BA7FC631B2}"/>
+                </a:ext>
+              </a:extLst>
+            </p:cNvPr>
+            <p:cNvSpPr txBox="1"/>
+            <p:nvPr/>
+          </p:nvSpPr>
+          <p:spPr>
+            <a:xfrm>
+              <a:off x="7627904" y="1329641"/>
+              <a:ext cx="4293659" cy="461665"/>
+            </a:xfrm>
+            <a:prstGeom prst="rect">
+              <a:avLst/>
+            </a:prstGeom>
+            <a:noFill/>
+          </p:spPr>
+          <p:txBody>
+            <a:bodyPr wrap="square" rtlCol="0">
+              <a:spAutoFit/>
+            </a:bodyPr>
+            <a:lstStyle/>
+            <a:p>
+              <a:pPr algn="ctr"/>
+              <a:r>
+                <a:rPr lang="en-GB" sz="2400" i="1" dirty="0">
+                  <a:solidFill>
+                    <a:schemeClr val="accent1"/>
+                  </a:solidFill>
+                </a:rPr>
+                <a:t>Images</a:t>
+              </a:r>
+            </a:p>
+          </p:txBody>
+        </p:sp>
+      </p:grpSp>
       <p:sp>
         <p:nvSpPr>
-          <p:cNvPr id="4" name="TextBox 3">
+          <p:cNvPr id="9" name="TextBox 8">
             <a:extLst>
               <a:ext uri="{FF2B5EF4-FFF2-40B4-BE49-F238E27FC236}">
-                <a16:creationId xmlns:a16="http://schemas.microsoft.com/office/drawing/2014/main" id="{31426854-EE0B-4A5A-AC6D-2BF50C4B1D90}"/>
+                <a16:creationId xmlns:a16="http://schemas.microsoft.com/office/drawing/2014/main" id="{60C1348B-849E-4AC2-AA52-28B28F16B914}"/>
               </a:ext>
             </a:extLst>
           </p:cNvPr>
@@ -4498,8 +5871,8 @@
         </p:nvSpPr>
         <p:spPr>
           <a:xfrm>
-            <a:off x="2052408" y="3136612"/>
-            <a:ext cx="8087183" cy="584775"/>
+            <a:off x="3949172" y="1493266"/>
+            <a:ext cx="4293659" cy="461665"/>
           </a:xfrm>
           <a:prstGeom prst="rect">
             <a:avLst/>
@@ -4514,21 +5887,171 @@
           <a:p>
             <a:pPr algn="ctr"/>
             <a:r>
-              <a:rPr lang="en-GB" sz="3200" dirty="0"/>
-              <a:t>Plotting</a:t>
-            </a:r>
-            <a:endParaRPr lang="en-GB" sz="2800" dirty="0">
-              <a:solidFill>
-                <a:schemeClr val="tx1"/>
-              </a:solidFill>
-            </a:endParaRPr>
+              <a:rPr lang="en-GB" sz="2400" i="1" dirty="0">
+                <a:solidFill>
+                  <a:schemeClr val="accent1"/>
+                </a:solidFill>
+              </a:rPr>
+              <a:t>Data plots</a:t>
+            </a:r>
           </a:p>
         </p:txBody>
       </p:sp>
+      <p:grpSp>
+        <p:nvGrpSpPr>
+          <p:cNvPr id="10" name="Group 9">
+            <a:extLst>
+              <a:ext uri="{FF2B5EF4-FFF2-40B4-BE49-F238E27FC236}">
+                <a16:creationId xmlns:a16="http://schemas.microsoft.com/office/drawing/2014/main" id="{045EA7EA-4307-4986-89EB-D4DC7F8CF533}"/>
+              </a:ext>
+            </a:extLst>
+          </p:cNvPr>
+          <p:cNvGrpSpPr/>
+          <p:nvPr/>
+        </p:nvGrpSpPr>
+        <p:grpSpPr>
+          <a:xfrm>
+            <a:off x="7807020" y="1493266"/>
+            <a:ext cx="4293659" cy="4198718"/>
+            <a:chOff x="7627904" y="1329641"/>
+            <a:chExt cx="4293659" cy="4198718"/>
+          </a:xfrm>
+        </p:grpSpPr>
+        <p:pic>
+          <p:nvPicPr>
+            <p:cNvPr id="11" name="Picture 10">
+              <a:extLst>
+                <a:ext uri="{FF2B5EF4-FFF2-40B4-BE49-F238E27FC236}">
+                  <a16:creationId xmlns:a16="http://schemas.microsoft.com/office/drawing/2014/main" id="{0D17DF4F-D9A9-49B9-AC00-23AED26979DA}"/>
+                </a:ext>
+              </a:extLst>
+            </p:cNvPr>
+            <p:cNvPicPr>
+              <a:picLocks noChangeAspect="1"/>
+            </p:cNvPicPr>
+            <p:nvPr/>
+          </p:nvPicPr>
+          <p:blipFill>
+            <a:blip r:embed="rId4"/>
+            <a:stretch>
+              <a:fillRect/>
+            </a:stretch>
+          </p:blipFill>
+          <p:spPr>
+            <a:xfrm>
+              <a:off x="7793534" y="1794559"/>
+              <a:ext cx="3962400" cy="3733800"/>
+            </a:xfrm>
+            <a:prstGeom prst="rect">
+              <a:avLst/>
+            </a:prstGeom>
+          </p:spPr>
+        </p:pic>
+        <p:sp>
+          <p:nvSpPr>
+            <p:cNvPr id="12" name="TextBox 11">
+              <a:extLst>
+                <a:ext uri="{FF2B5EF4-FFF2-40B4-BE49-F238E27FC236}">
+                  <a16:creationId xmlns:a16="http://schemas.microsoft.com/office/drawing/2014/main" id="{7ADBE9CF-E30F-4670-8E73-5FFAB22C472E}"/>
+                </a:ext>
+              </a:extLst>
+            </p:cNvPr>
+            <p:cNvSpPr txBox="1"/>
+            <p:nvPr/>
+          </p:nvSpPr>
+          <p:spPr>
+            <a:xfrm>
+              <a:off x="7627904" y="1329641"/>
+              <a:ext cx="4293659" cy="461665"/>
+            </a:xfrm>
+            <a:prstGeom prst="rect">
+              <a:avLst/>
+            </a:prstGeom>
+            <a:noFill/>
+          </p:spPr>
+          <p:txBody>
+            <a:bodyPr wrap="square" rtlCol="0">
+              <a:spAutoFit/>
+            </a:bodyPr>
+            <a:lstStyle/>
+            <a:p>
+              <a:pPr algn="ctr"/>
+              <a:r>
+                <a:rPr lang="en-GB" sz="2400" i="1" dirty="0">
+                  <a:solidFill>
+                    <a:schemeClr val="accent1"/>
+                  </a:solidFill>
+                </a:rPr>
+                <a:t>Controls</a:t>
+              </a:r>
+            </a:p>
+          </p:txBody>
+        </p:sp>
+      </p:grpSp>
+      <p:pic>
+        <p:nvPicPr>
+          <p:cNvPr id="14" name="Picture 13">
+            <a:extLst>
+              <a:ext uri="{FF2B5EF4-FFF2-40B4-BE49-F238E27FC236}">
+                <a16:creationId xmlns:a16="http://schemas.microsoft.com/office/drawing/2014/main" id="{500E79FF-BB31-4812-B440-78CA01749E95}"/>
+              </a:ext>
+            </a:extLst>
+          </p:cNvPr>
+          <p:cNvPicPr>
+            <a:picLocks noChangeAspect="1"/>
+          </p:cNvPicPr>
+          <p:nvPr/>
+        </p:nvPicPr>
+        <p:blipFill>
+          <a:blip r:embed="rId5"/>
+          <a:stretch>
+            <a:fillRect/>
+          </a:stretch>
+        </p:blipFill>
+        <p:spPr>
+          <a:xfrm>
+            <a:off x="4384982" y="2382754"/>
+            <a:ext cx="3962400" cy="3733800"/>
+          </a:xfrm>
+          <a:prstGeom prst="rect">
+            <a:avLst/>
+          </a:prstGeom>
+        </p:spPr>
+      </p:pic>
+      <p:pic>
+        <p:nvPicPr>
+          <p:cNvPr id="15" name="Picture 14">
+            <a:extLst>
+              <a:ext uri="{FF2B5EF4-FFF2-40B4-BE49-F238E27FC236}">
+                <a16:creationId xmlns:a16="http://schemas.microsoft.com/office/drawing/2014/main" id="{AC65F24A-ACA0-4171-8E29-98A7A94BF36C}"/>
+              </a:ext>
+            </a:extLst>
+          </p:cNvPr>
+          <p:cNvPicPr>
+            <a:picLocks noChangeAspect="1"/>
+          </p:cNvPicPr>
+          <p:nvPr/>
+        </p:nvPicPr>
+        <p:blipFill>
+          <a:blip r:embed="rId6"/>
+          <a:stretch>
+            <a:fillRect/>
+          </a:stretch>
+        </p:blipFill>
+        <p:spPr>
+          <a:xfrm>
+            <a:off x="4729842" y="2774835"/>
+            <a:ext cx="3962400" cy="3733800"/>
+          </a:xfrm>
+          <a:prstGeom prst="rect">
+            <a:avLst/>
+          </a:prstGeom>
+        </p:spPr>
+      </p:pic>
     </p:spTree>
     <p:extLst>
       <p:ext uri="{BB962C8B-B14F-4D97-AF65-F5344CB8AC3E}">
-        <p14:creationId xmlns:p14="http://schemas.microsoft.com/office/powerpoint/2010/main" val="2395051032"/>
+        <p14:creationId xmlns:p14="http://schemas.microsoft.com/office/powerpoint/2010/main" val="3757621911"/>
       </p:ext>
     </p:extLst>
   </p:cSld>
@@ -4572,7 +6095,7 @@
           <p:cNvPr id="2" name="Title 1">
             <a:extLst>
               <a:ext uri="{FF2B5EF4-FFF2-40B4-BE49-F238E27FC236}">
-                <a16:creationId xmlns:a16="http://schemas.microsoft.com/office/drawing/2014/main" id="{FA63CE58-31D3-4CE4-B980-300475A8D6AB}"/>
+                <a16:creationId xmlns:a16="http://schemas.microsoft.com/office/drawing/2014/main" id="{ED9B5A03-494F-4276-A82C-E68720BD23C2}"/>
               </a:ext>
             </a:extLst>
           </p:cNvPr>
@@ -4588,7 +6111,10 @@
           <a:bodyPr/>
           <a:lstStyle/>
           <a:p>
-            <a:endParaRPr lang="en-GB"/>
+            <a:r>
+              <a:rPr lang="en-GB" dirty="0"/>
+              <a:t>Some handy figure functions</a:t>
+            </a:r>
           </a:p>
         </p:txBody>
       </p:sp>
@@ -4597,7 +6123,7 @@
           <p:cNvPr id="3" name="Content Placeholder 2">
             <a:extLst>
               <a:ext uri="{FF2B5EF4-FFF2-40B4-BE49-F238E27FC236}">
-                <a16:creationId xmlns:a16="http://schemas.microsoft.com/office/drawing/2014/main" id="{D547804F-4C36-4E05-A85C-C0624CAF1BA9}"/>
+                <a16:creationId xmlns:a16="http://schemas.microsoft.com/office/drawing/2014/main" id="{96796997-C7A7-4A65-A25A-0A5EBA69645B}"/>
               </a:ext>
             </a:extLst>
           </p:cNvPr>
@@ -4614,78 +6140,30 @@
           <a:lstStyle/>
           <a:p>
             <a:r>
-              <a:rPr lang="en-GB" sz="2000" dirty="0"/>
-              <a:t>Talk about plotting</a:t>
-            </a:r>
-          </a:p>
-          <a:p>
-            <a:pPr lvl="1"/>
-            <a:r>
-              <a:rPr lang="en-GB" sz="1800" dirty="0"/>
-              <a:t>Talk about main concepts using scatter plot</a:t>
-            </a:r>
-          </a:p>
-          <a:p>
-            <a:pPr lvl="2"/>
-            <a:r>
-              <a:rPr lang="en-GB" sz="1400" dirty="0"/>
-              <a:t>The axes objects</a:t>
-            </a:r>
-          </a:p>
-          <a:p>
-            <a:pPr lvl="2"/>
-            <a:r>
-              <a:rPr lang="en-GB" sz="1400" dirty="0"/>
-              <a:t>Changing line properties</a:t>
-            </a:r>
-          </a:p>
-          <a:p>
-            <a:pPr lvl="2"/>
-            <a:r>
-              <a:rPr lang="en-GB" sz="1400" dirty="0"/>
-              <a:t>Changing marker types</a:t>
-            </a:r>
-          </a:p>
-          <a:p>
-            <a:pPr lvl="2"/>
-            <a:r>
-              <a:rPr lang="en-GB" sz="1400" dirty="0"/>
-              <a:t>The shorthand colour names (‘</a:t>
-            </a:r>
-            <a:r>
-              <a:rPr lang="en-GB" sz="1400" dirty="0" err="1"/>
-              <a:t>b’,’g’,’k</a:t>
-            </a:r>
-            <a:r>
-              <a:rPr lang="en-GB" sz="1400" dirty="0"/>
-              <a:t>’, etc.)</a:t>
-            </a:r>
-          </a:p>
-          <a:p>
-            <a:pPr lvl="2"/>
-            <a:r>
-              <a:rPr lang="en-GB" sz="1400" dirty="0"/>
-              <a:t>Using hold on and hold off to add elements to a plot</a:t>
-            </a:r>
-          </a:p>
-          <a:p>
-            <a:pPr lvl="2"/>
-            <a:endParaRPr lang="en-GB" sz="800" dirty="0"/>
-          </a:p>
-          <a:p>
-            <a:pPr lvl="2"/>
-            <a:endParaRPr lang="en-GB" sz="1100" dirty="0"/>
-          </a:p>
-          <a:p>
-            <a:pPr lvl="2"/>
-            <a:endParaRPr lang="en-GB" sz="600" dirty="0"/>
+              <a:rPr lang="en-GB" dirty="0" err="1"/>
+              <a:t>clf</a:t>
+            </a:r>
+            <a:endParaRPr lang="en-GB" dirty="0"/>
+          </a:p>
+          <a:p>
+            <a:r>
+              <a:rPr lang="en-GB" dirty="0" err="1"/>
+              <a:t>gcf</a:t>
+            </a:r>
+            <a:endParaRPr lang="en-GB" dirty="0"/>
+          </a:p>
+          <a:p>
+            <a:r>
+              <a:rPr lang="en-GB" dirty="0"/>
+              <a:t>close all</a:t>
+            </a:r>
           </a:p>
         </p:txBody>
       </p:sp>
     </p:spTree>
     <p:extLst>
       <p:ext uri="{BB962C8B-B14F-4D97-AF65-F5344CB8AC3E}">
-        <p14:creationId xmlns:p14="http://schemas.microsoft.com/office/powerpoint/2010/main" val="616477775"/>
+        <p14:creationId xmlns:p14="http://schemas.microsoft.com/office/powerpoint/2010/main" val="2028804257"/>
       </p:ext>
     </p:extLst>
   </p:cSld>
@@ -4780,11 +6258,7 @@
             <a:pPr algn="ctr"/>
             <a:r>
               <a:rPr lang="en-GB" sz="3200" dirty="0"/>
-              <a:t>Designing a </a:t>
-            </a:r>
-            <a:r>
-              <a:rPr lang="en-GB" sz="3200"/>
-              <a:t>user interface</a:t>
+              <a:t>Plotting</a:t>
             </a:r>
             <a:endParaRPr lang="en-GB" sz="2800" dirty="0">
               <a:solidFill>
@@ -4797,7 +6271,7 @@
     </p:spTree>
     <p:extLst>
       <p:ext uri="{BB962C8B-B14F-4D97-AF65-F5344CB8AC3E}">
-        <p14:creationId xmlns:p14="http://schemas.microsoft.com/office/powerpoint/2010/main" val="2590606000"/>
+        <p14:creationId xmlns:p14="http://schemas.microsoft.com/office/powerpoint/2010/main" val="2395051032"/>
       </p:ext>
     </p:extLst>
   </p:cSld>

</xml_diff>